<commit_message>
Fixes to the Workshop 2
</commit_message>
<xml_diff>
--- a/2/presentation/Angular 2.pptx
+++ b/2/presentation/Angular 2.pptx
@@ -21331,42 +21331,6 @@
       </p:sp>
       <p:pic>
         <p:nvPicPr>
-          <p:cNvPr id="14" name="Picture 13" descr="A close up of a logo&#10;&#10;Description generated with high confidence">
-            <a:extLst>
-              <a:ext uri="{FF2B5EF4-FFF2-40B4-BE49-F238E27FC236}">
-                <a16:creationId xmlns:a16="http://schemas.microsoft.com/office/drawing/2014/main" id="{00C099D8-5D9F-4ACA-A3C5-7A55D58624F8}"/>
-              </a:ext>
-            </a:extLst>
-          </p:cNvPr>
-          <p:cNvPicPr>
-            <a:picLocks noChangeAspect="1"/>
-          </p:cNvPicPr>
-          <p:nvPr/>
-        </p:nvPicPr>
-        <p:blipFill>
-          <a:blip r:embed="rId2">
-            <a:extLst>
-              <a:ext uri="{28A0092B-C50C-407E-A947-70E740481C1C}">
-                <a14:useLocalDpi xmlns:a14="http://schemas.microsoft.com/office/drawing/2010/main" val="0"/>
-              </a:ext>
-            </a:extLst>
-          </a:blip>
-          <a:stretch>
-            <a:fillRect/>
-          </a:stretch>
-        </p:blipFill>
-        <p:spPr>
-          <a:xfrm>
-            <a:off x="1175242" y="3050865"/>
-            <a:ext cx="3374811" cy="964233"/>
-          </a:xfrm>
-          <a:prstGeom prst="rect">
-            <a:avLst/>
-          </a:prstGeom>
-        </p:spPr>
-      </p:pic>
-      <p:pic>
-        <p:nvPicPr>
           <p:cNvPr id="9" name="Content Placeholder 8">
             <a:extLst>
               <a:ext uri="{FF2B5EF4-FFF2-40B4-BE49-F238E27FC236}">
@@ -21382,7 +21346,7 @@
           </p:nvPr>
         </p:nvPicPr>
         <p:blipFill>
-          <a:blip r:embed="rId3"/>
+          <a:blip r:embed="rId2"/>
           <a:stretch>
             <a:fillRect/>
           </a:stretch>
@@ -21391,6 +21355,36 @@
           <a:xfrm>
             <a:off x="5997575" y="2693486"/>
             <a:ext cx="5183188" cy="1251951"/>
+          </a:xfrm>
+          <a:prstGeom prst="rect">
+            <a:avLst/>
+          </a:prstGeom>
+        </p:spPr>
+      </p:pic>
+      <p:pic>
+        <p:nvPicPr>
+          <p:cNvPr id="3" name="Picture 2">
+            <a:extLst>
+              <a:ext uri="{FF2B5EF4-FFF2-40B4-BE49-F238E27FC236}">
+                <a16:creationId xmlns:a16="http://schemas.microsoft.com/office/drawing/2014/main" id="{1A42DDF5-320A-49A9-9C81-B3F98F064D88}"/>
+              </a:ext>
+            </a:extLst>
+          </p:cNvPr>
+          <p:cNvPicPr>
+            <a:picLocks noChangeAspect="1"/>
+          </p:cNvPicPr>
+          <p:nvPr/>
+        </p:nvPicPr>
+        <p:blipFill>
+          <a:blip r:embed="rId3"/>
+          <a:stretch>
+            <a:fillRect/>
+          </a:stretch>
+        </p:blipFill>
+        <p:spPr>
+          <a:xfrm>
+            <a:off x="1338676" y="2932109"/>
+            <a:ext cx="2080006" cy="993781"/>
           </a:xfrm>
           <a:prstGeom prst="rect">
             <a:avLst/>
@@ -29188,55 +29182,45 @@
               <a:rPr lang="pl-PL" dirty="0" err="1">
                 <a:hlinkClick r:id="rId2"/>
               </a:rPr>
+              <a:t>Events</a:t>
+            </a:r>
+            <a:endParaRPr lang="pl-PL" dirty="0">
+              <a:hlinkClick r:id="rId3"/>
+            </a:endParaRPr>
+          </a:p>
+          <a:p>
+            <a:r>
+              <a:rPr lang="pl-PL" dirty="0" err="1">
+                <a:hlinkClick r:id="rId3"/>
+              </a:rPr>
               <a:t>Built</a:t>
             </a:r>
-            <a:r>
-              <a:rPr lang="pl-PL" dirty="0">
-                <a:hlinkClick r:id="rId2"/>
-              </a:rPr>
-              <a:t>-in </a:t>
-            </a:r>
-            <a:r>
-              <a:rPr lang="pl-PL" dirty="0" err="1">
-                <a:hlinkClick r:id="rId2"/>
-              </a:rPr>
-              <a:t>Pipes</a:t>
-            </a:r>
-            <a:endParaRPr lang="pl-PL" dirty="0"/>
-          </a:p>
-          <a:p>
             <a:r>
               <a:rPr lang="pl-PL" dirty="0">
                 <a:hlinkClick r:id="rId3"/>
               </a:rPr>
-              <a:t>Component </a:t>
+              <a:t>-in </a:t>
             </a:r>
             <a:r>
               <a:rPr lang="pl-PL" dirty="0" err="1">
                 <a:hlinkClick r:id="rId3"/>
               </a:rPr>
-              <a:t>styles</a:t>
+              <a:t>Pipes</a:t>
             </a:r>
             <a:endParaRPr lang="pl-PL" dirty="0"/>
           </a:p>
           <a:p>
+            <a:r>
+              <a:rPr lang="pl-PL" dirty="0">
+                <a:hlinkClick r:id="rId4"/>
+              </a:rPr>
+              <a:t>Component </a:t>
+            </a:r>
             <a:r>
               <a:rPr lang="pl-PL" dirty="0" err="1">
                 <a:hlinkClick r:id="rId4"/>
               </a:rPr>
-              <a:t>View</a:t>
-            </a:r>
-            <a:r>
-              <a:rPr lang="pl-PL" dirty="0">
-                <a:hlinkClick r:id="rId4"/>
-              </a:rPr>
-              <a:t> </a:t>
-            </a:r>
-            <a:r>
-              <a:rPr lang="pl-PL" dirty="0" err="1">
-                <a:hlinkClick r:id="rId4"/>
-              </a:rPr>
-              <a:t>encapsulation</a:t>
+              <a:t>styles</a:t>
             </a:r>
             <a:endParaRPr lang="pl-PL" dirty="0"/>
           </a:p>
@@ -29245,7 +29229,7 @@
               <a:rPr lang="pl-PL" dirty="0" err="1">
                 <a:hlinkClick r:id="rId5"/>
               </a:rPr>
-              <a:t>Lifecycle</a:t>
+              <a:t>View</a:t>
             </a:r>
             <a:r>
               <a:rPr lang="pl-PL" dirty="0">
@@ -29257,41 +29241,62 @@
               <a:rPr lang="pl-PL" dirty="0" err="1">
                 <a:hlinkClick r:id="rId5"/>
               </a:rPr>
-              <a:t>hooks</a:t>
+              <a:t>encapsulation</a:t>
             </a:r>
             <a:endParaRPr lang="pl-PL" dirty="0"/>
           </a:p>
           <a:p>
+            <a:r>
+              <a:rPr lang="pl-PL" dirty="0" err="1">
+                <a:hlinkClick r:id="rId6"/>
+              </a:rPr>
+              <a:t>Lifecycle</a:t>
+            </a:r>
             <a:r>
               <a:rPr lang="pl-PL" dirty="0">
                 <a:hlinkClick r:id="rId6"/>
               </a:rPr>
-              <a:t>Font </a:t>
+              <a:t> </a:t>
             </a:r>
             <a:r>
               <a:rPr lang="pl-PL" dirty="0" err="1">
                 <a:hlinkClick r:id="rId6"/>
               </a:rPr>
-              <a:t>awesome</a:t>
+              <a:t>hooks</a:t>
             </a:r>
             <a:endParaRPr lang="pl-PL" dirty="0"/>
           </a:p>
           <a:p>
+            <a:r>
+              <a:rPr lang="pl-PL" dirty="0">
+                <a:hlinkClick r:id="rId7"/>
+              </a:rPr>
+              <a:t>Font </a:t>
+            </a:r>
             <a:r>
               <a:rPr lang="pl-PL" dirty="0" err="1">
                 <a:hlinkClick r:id="rId7"/>
               </a:rPr>
+              <a:t>awesome</a:t>
+            </a:r>
+            <a:endParaRPr lang="pl-PL" dirty="0"/>
+          </a:p>
+          <a:p>
+            <a:r>
+              <a:rPr lang="pl-PL" dirty="0" err="1">
+                <a:hlinkClick r:id="rId8"/>
+              </a:rPr>
               <a:t>Dependecy</a:t>
             </a:r>
             <a:r>
               <a:rPr lang="pl-PL" dirty="0">
-                <a:hlinkClick r:id="rId7"/>
+                <a:hlinkClick r:id="rId8"/>
               </a:rPr>
               <a:t> </a:t>
             </a:r>
             <a:r>
               <a:rPr lang="pl-PL" dirty="0" err="1">
-                <a:hlinkClick r:id="rId7"/>
+                <a:hlinkClick r:id="rId8"/>
               </a:rPr>
               <a:t>Injection</a:t>
             </a:r>
@@ -29319,7 +29324,7 @@
           </p:nvPr>
         </p:nvPicPr>
         <p:blipFill>
-          <a:blip r:embed="rId8">
+          <a:blip r:embed="rId9">
             <a:extLst>
               <a:ext uri="{28A0092B-C50C-407E-A947-70E740481C1C}">
                 <a14:useLocalDpi xmlns:a14="http://schemas.microsoft.com/office/drawing/2010/main" val="0"/>
@@ -29589,7 +29594,7 @@
         </p:nvSpPr>
         <p:spPr>
           <a:xfrm>
-            <a:off x="2845573" y="4027082"/>
+            <a:off x="2942849" y="4041955"/>
             <a:ext cx="2160240" cy="936104"/>
           </a:xfrm>
           <a:prstGeom prst="accentBorderCallout1">
@@ -29685,60 +29690,6 @@
       </p:sp>
       <p:sp>
         <p:nvSpPr>
-          <p:cNvPr id="6" name="Objaśnienie liniowe 1 (obramowanie i kreska) 3">
-            <a:extLst>
-              <a:ext uri="{FF2B5EF4-FFF2-40B4-BE49-F238E27FC236}">
-                <a16:creationId xmlns:a16="http://schemas.microsoft.com/office/drawing/2014/main" id="{FB7A5B4B-E9EF-407E-8251-C052BDE2ED66}"/>
-              </a:ext>
-            </a:extLst>
-          </p:cNvPr>
-          <p:cNvSpPr/>
-          <p:nvPr/>
-        </p:nvSpPr>
-        <p:spPr>
-          <a:xfrm>
-            <a:off x="2845573" y="4027082"/>
-            <a:ext cx="2160240" cy="936104"/>
-          </a:xfrm>
-          <a:prstGeom prst="accentBorderCallout1">
-            <a:avLst>
-              <a:gd name="adj1" fmla="val 18750"/>
-              <a:gd name="adj2" fmla="val -8333"/>
-              <a:gd name="adj3" fmla="val -76852"/>
-              <a:gd name="adj4" fmla="val 13112"/>
-            </a:avLst>
-          </a:prstGeom>
-        </p:spPr>
-        <p:style>
-          <a:lnRef idx="2">
-            <a:schemeClr val="accent2">
-              <a:shade val="50000"/>
-            </a:schemeClr>
-          </a:lnRef>
-          <a:fillRef idx="1">
-            <a:schemeClr val="accent2"/>
-          </a:fillRef>
-          <a:effectRef idx="0">
-            <a:schemeClr val="accent2"/>
-          </a:effectRef>
-          <a:fontRef idx="minor">
-            <a:schemeClr val="lt1"/>
-          </a:fontRef>
-        </p:style>
-        <p:txBody>
-          <a:bodyPr rtlCol="0" anchor="ctr"/>
-          <a:lstStyle/>
-          <a:p>
-            <a:pPr algn="ctr"/>
-            <a:r>
-              <a:rPr lang="pl-PL" sz="2400" dirty="0"/>
-              <a:t>Cel bindingu    []</a:t>
-            </a:r>
-          </a:p>
-        </p:txBody>
-      </p:sp>
-      <p:sp>
-        <p:nvSpPr>
           <p:cNvPr id="8" name="Objaśnienie liniowe 1 (obramowanie i kreska) 4">
             <a:extLst>
               <a:ext uri="{FF2B5EF4-FFF2-40B4-BE49-F238E27FC236}">
@@ -29787,6 +29738,60 @@
             <a:r>
               <a:rPr lang="pl-PL" sz="2400" dirty="0"/>
               <a:t>Źródło bindingu ’’</a:t>
+            </a:r>
+          </a:p>
+        </p:txBody>
+      </p:sp>
+      <p:sp>
+        <p:nvSpPr>
+          <p:cNvPr id="6" name="Objaśnienie liniowe 1 (obramowanie i kreska) 3">
+            <a:extLst>
+              <a:ext uri="{FF2B5EF4-FFF2-40B4-BE49-F238E27FC236}">
+                <a16:creationId xmlns:a16="http://schemas.microsoft.com/office/drawing/2014/main" id="{FB7A5B4B-E9EF-407E-8251-C052BDE2ED66}"/>
+              </a:ext>
+            </a:extLst>
+          </p:cNvPr>
+          <p:cNvSpPr/>
+          <p:nvPr/>
+        </p:nvSpPr>
+        <p:spPr>
+          <a:xfrm>
+            <a:off x="2942849" y="4041955"/>
+            <a:ext cx="2160240" cy="936104"/>
+          </a:xfrm>
+          <a:prstGeom prst="accentBorderCallout1">
+            <a:avLst>
+              <a:gd name="adj1" fmla="val 18750"/>
+              <a:gd name="adj2" fmla="val -8333"/>
+              <a:gd name="adj3" fmla="val -76852"/>
+              <a:gd name="adj4" fmla="val 13112"/>
+            </a:avLst>
+          </a:prstGeom>
+        </p:spPr>
+        <p:style>
+          <a:lnRef idx="2">
+            <a:schemeClr val="accent2">
+              <a:shade val="50000"/>
+            </a:schemeClr>
+          </a:lnRef>
+          <a:fillRef idx="1">
+            <a:schemeClr val="accent2"/>
+          </a:fillRef>
+          <a:effectRef idx="0">
+            <a:schemeClr val="accent2"/>
+          </a:effectRef>
+          <a:fontRef idx="minor">
+            <a:schemeClr val="lt1"/>
+          </a:fontRef>
+        </p:style>
+        <p:txBody>
+          <a:bodyPr rtlCol="0" anchor="ctr"/>
+          <a:lstStyle/>
+          <a:p>
+            <a:pPr algn="ctr"/>
+            <a:r>
+              <a:rPr lang="pl-PL" sz="2400" dirty="0"/>
+              <a:t>Cel bindingu    []</a:t>
             </a:r>
           </a:p>
         </p:txBody>
@@ -30115,7 +30120,7 @@
                             </p:stCondLst>
                             <p:childTnLst>
                               <p:par>
-                                <p:cTn id="15" presetID="10" presetClass="entr" presetSubtype="0" fill="hold" nodeType="clickEffect">
+                                <p:cTn id="15" presetID="10" presetClass="entr" presetSubtype="0" fill="hold" grpId="0" nodeType="clickEffect">
                                   <p:stCondLst>
                                     <p:cond delay="0"/>
                                   </p:stCondLst>
@@ -30128,11 +30133,7 @@
                                           </p:stCondLst>
                                         </p:cTn>
                                         <p:tgtEl>
-                                          <p:spTgt spid="3">
-                                            <p:txEl>
-                                              <p:pRg st="1" end="1"/>
-                                            </p:txEl>
-                                          </p:spTgt>
+                                          <p:spTgt spid="6"/>
                                         </p:tgtEl>
                                         <p:attrNameLst>
                                           <p:attrName>style.visibility</p:attrName>
@@ -30146,11 +30147,7 @@
                                       <p:cBhvr>
                                         <p:cTn id="17" dur="500"/>
                                         <p:tgtEl>
-                                          <p:spTgt spid="3">
-                                            <p:txEl>
-                                              <p:pRg st="1" end="1"/>
-                                            </p:txEl>
-                                          </p:spTgt>
+                                          <p:spTgt spid="6"/>
                                         </p:tgtEl>
                                       </p:cBhvr>
                                     </p:animEffect>
@@ -30176,7 +30173,7 @@
                             </p:stCondLst>
                             <p:childTnLst>
                               <p:par>
-                                <p:cTn id="20" presetID="10" presetClass="entr" presetSubtype="0" fill="hold" nodeType="clickEffect">
+                                <p:cTn id="20" presetID="10" presetClass="entr" presetSubtype="0" fill="hold" grpId="0" nodeType="clickEffect">
                                   <p:stCondLst>
                                     <p:cond delay="0"/>
                                   </p:stCondLst>
@@ -30184,6 +30181,228 @@
                                     <p:set>
                                       <p:cBhvr>
                                         <p:cTn id="21" dur="1" fill="hold">
+                                          <p:stCondLst>
+                                            <p:cond delay="0"/>
+                                          </p:stCondLst>
+                                        </p:cTn>
+                                        <p:tgtEl>
+                                          <p:spTgt spid="8"/>
+                                        </p:tgtEl>
+                                        <p:attrNameLst>
+                                          <p:attrName>style.visibility</p:attrName>
+                                        </p:attrNameLst>
+                                      </p:cBhvr>
+                                      <p:to>
+                                        <p:strVal val="visible"/>
+                                      </p:to>
+                                    </p:set>
+                                    <p:animEffect transition="in" filter="fade">
+                                      <p:cBhvr>
+                                        <p:cTn id="22" dur="500"/>
+                                        <p:tgtEl>
+                                          <p:spTgt spid="8"/>
+                                        </p:tgtEl>
+                                      </p:cBhvr>
+                                    </p:animEffect>
+                                  </p:childTnLst>
+                                </p:cTn>
+                              </p:par>
+                            </p:childTnLst>
+                          </p:cTn>
+                        </p:par>
+                      </p:childTnLst>
+                    </p:cTn>
+                  </p:par>
+                  <p:par>
+                    <p:cTn id="23" fill="hold">
+                      <p:stCondLst>
+                        <p:cond delay="indefinite"/>
+                      </p:stCondLst>
+                      <p:childTnLst>
+                        <p:par>
+                          <p:cTn id="24" fill="hold">
+                            <p:stCondLst>
+                              <p:cond delay="0"/>
+                            </p:stCondLst>
+                            <p:childTnLst>
+                              <p:par>
+                                <p:cTn id="25" presetID="1" presetClass="exit" presetSubtype="0" fill="hold" grpId="1" nodeType="clickEffect">
+                                  <p:stCondLst>
+                                    <p:cond delay="0"/>
+                                  </p:stCondLst>
+                                  <p:childTnLst>
+                                    <p:set>
+                                      <p:cBhvr>
+                                        <p:cTn id="26" dur="1" fill="hold">
+                                          <p:stCondLst>
+                                            <p:cond delay="0"/>
+                                          </p:stCondLst>
+                                        </p:cTn>
+                                        <p:tgtEl>
+                                          <p:spTgt spid="6"/>
+                                        </p:tgtEl>
+                                        <p:attrNameLst>
+                                          <p:attrName>style.visibility</p:attrName>
+                                        </p:attrNameLst>
+                                      </p:cBhvr>
+                                      <p:to>
+                                        <p:strVal val="hidden"/>
+                                      </p:to>
+                                    </p:set>
+                                  </p:childTnLst>
+                                </p:cTn>
+                              </p:par>
+                              <p:par>
+                                <p:cTn id="27" presetID="1" presetClass="exit" presetSubtype="0" fill="hold" grpId="1" nodeType="withEffect">
+                                  <p:stCondLst>
+                                    <p:cond delay="0"/>
+                                  </p:stCondLst>
+                                  <p:childTnLst>
+                                    <p:set>
+                                      <p:cBhvr>
+                                        <p:cTn id="28" dur="1" fill="hold">
+                                          <p:stCondLst>
+                                            <p:cond delay="0"/>
+                                          </p:stCondLst>
+                                        </p:cTn>
+                                        <p:tgtEl>
+                                          <p:spTgt spid="8"/>
+                                        </p:tgtEl>
+                                        <p:attrNameLst>
+                                          <p:attrName>style.visibility</p:attrName>
+                                        </p:attrNameLst>
+                                      </p:cBhvr>
+                                      <p:to>
+                                        <p:strVal val="hidden"/>
+                                      </p:to>
+                                    </p:set>
+                                  </p:childTnLst>
+                                </p:cTn>
+                              </p:par>
+                              <p:par>
+                                <p:cTn id="29" presetID="1" presetClass="exit" presetSubtype="0" fill="hold" grpId="1" nodeType="withEffect">
+                                  <p:stCondLst>
+                                    <p:cond delay="0"/>
+                                  </p:stCondLst>
+                                  <p:childTnLst>
+                                    <p:set>
+                                      <p:cBhvr>
+                                        <p:cTn id="30" dur="1" fill="hold">
+                                          <p:stCondLst>
+                                            <p:cond delay="0"/>
+                                          </p:stCondLst>
+                                        </p:cTn>
+                                        <p:tgtEl>
+                                          <p:spTgt spid="4"/>
+                                        </p:tgtEl>
+                                        <p:attrNameLst>
+                                          <p:attrName>style.visibility</p:attrName>
+                                        </p:attrNameLst>
+                                      </p:cBhvr>
+                                      <p:to>
+                                        <p:strVal val="hidden"/>
+                                      </p:to>
+                                    </p:set>
+                                  </p:childTnLst>
+                                </p:cTn>
+                              </p:par>
+                              <p:par>
+                                <p:cTn id="31" presetID="1" presetClass="exit" presetSubtype="0" fill="hold" grpId="1" nodeType="withEffect">
+                                  <p:stCondLst>
+                                    <p:cond delay="0"/>
+                                  </p:stCondLst>
+                                  <p:childTnLst>
+                                    <p:set>
+                                      <p:cBhvr>
+                                        <p:cTn id="32" dur="1" fill="hold">
+                                          <p:stCondLst>
+                                            <p:cond delay="0"/>
+                                          </p:stCondLst>
+                                        </p:cTn>
+                                        <p:tgtEl>
+                                          <p:spTgt spid="5"/>
+                                        </p:tgtEl>
+                                        <p:attrNameLst>
+                                          <p:attrName>style.visibility</p:attrName>
+                                        </p:attrNameLst>
+                                      </p:cBhvr>
+                                      <p:to>
+                                        <p:strVal val="hidden"/>
+                                      </p:to>
+                                    </p:set>
+                                  </p:childTnLst>
+                                </p:cTn>
+                              </p:par>
+                              <p:par>
+                                <p:cTn id="33" presetID="10" presetClass="entr" presetSubtype="0" fill="hold" nodeType="withEffect">
+                                  <p:stCondLst>
+                                    <p:cond delay="0"/>
+                                  </p:stCondLst>
+                                  <p:childTnLst>
+                                    <p:set>
+                                      <p:cBhvr>
+                                        <p:cTn id="34" dur="1" fill="hold">
+                                          <p:stCondLst>
+                                            <p:cond delay="0"/>
+                                          </p:stCondLst>
+                                        </p:cTn>
+                                        <p:tgtEl>
+                                          <p:spTgt spid="3">
+                                            <p:txEl>
+                                              <p:pRg st="1" end="1"/>
+                                            </p:txEl>
+                                          </p:spTgt>
+                                        </p:tgtEl>
+                                        <p:attrNameLst>
+                                          <p:attrName>style.visibility</p:attrName>
+                                        </p:attrNameLst>
+                                      </p:cBhvr>
+                                      <p:to>
+                                        <p:strVal val="visible"/>
+                                      </p:to>
+                                    </p:set>
+                                    <p:animEffect transition="in" filter="fade">
+                                      <p:cBhvr>
+                                        <p:cTn id="35" dur="500"/>
+                                        <p:tgtEl>
+                                          <p:spTgt spid="3">
+                                            <p:txEl>
+                                              <p:pRg st="1" end="1"/>
+                                            </p:txEl>
+                                          </p:spTgt>
+                                        </p:tgtEl>
+                                      </p:cBhvr>
+                                    </p:animEffect>
+                                  </p:childTnLst>
+                                </p:cTn>
+                              </p:par>
+                            </p:childTnLst>
+                          </p:cTn>
+                        </p:par>
+                      </p:childTnLst>
+                    </p:cTn>
+                  </p:par>
+                  <p:par>
+                    <p:cTn id="36" fill="hold">
+                      <p:stCondLst>
+                        <p:cond delay="indefinite"/>
+                      </p:stCondLst>
+                      <p:childTnLst>
+                        <p:par>
+                          <p:cTn id="37" fill="hold">
+                            <p:stCondLst>
+                              <p:cond delay="0"/>
+                            </p:stCondLst>
+                            <p:childTnLst>
+                              <p:par>
+                                <p:cTn id="38" presetID="10" presetClass="entr" presetSubtype="0" fill="hold" nodeType="clickEffect">
+                                  <p:stCondLst>
+                                    <p:cond delay="0"/>
+                                  </p:stCondLst>
+                                  <p:childTnLst>
+                                    <p:set>
+                                      <p:cBhvr>
+                                        <p:cTn id="39" dur="1" fill="hold">
                                           <p:stCondLst>
                                             <p:cond delay="0"/>
                                           </p:stCondLst>
@@ -30205,7 +30424,7 @@
                                     </p:set>
                                     <p:animEffect transition="in" filter="fade">
                                       <p:cBhvr>
-                                        <p:cTn id="22" dur="500"/>
+                                        <p:cTn id="40" dur="500"/>
                                         <p:tgtEl>
                                           <p:spTgt spid="3">
                                             <p:txEl>
@@ -30247,7 +30466,13 @@
     </p:tnLst>
     <p:bldLst>
       <p:bldP spid="4" grpId="0" animBg="1"/>
+      <p:bldP spid="4" grpId="1" animBg="1"/>
       <p:bldP spid="5" grpId="0" animBg="1"/>
+      <p:bldP spid="5" grpId="1" animBg="1"/>
+      <p:bldP spid="8" grpId="0" animBg="1"/>
+      <p:bldP spid="8" grpId="1" animBg="1"/>
+      <p:bldP spid="6" grpId="0" animBg="1"/>
+      <p:bldP spid="6" grpId="1" animBg="1"/>
     </p:bldLst>
   </p:timing>
 </p:sld>
@@ -30362,7 +30587,19 @@
             </a:pPr>
             <a:r>
               <a:rPr lang="pl-PL" dirty="0"/>
-              <a:t>&lt;h1&gt;{{pageTitle}}&lt;/h1&gt;</a:t>
+              <a:t>&lt;h1&gt;</a:t>
+            </a:r>
+            <a:r>
+              <a:rPr lang="pl-PL" dirty="0">
+                <a:solidFill>
+                  <a:schemeClr val="accent6"/>
+                </a:solidFill>
+              </a:rPr>
+              <a:t>{{pageTitle}}</a:t>
+            </a:r>
+            <a:r>
+              <a:rPr lang="pl-PL" dirty="0"/>
+              <a:t>&lt;/h1&gt;</a:t>
             </a:r>
           </a:p>
           <a:p>
@@ -30371,7 +30608,19 @@
             </a:pPr>
             <a:r>
               <a:rPr lang="pl-PL" dirty="0"/>
-              <a:t>&lt;img [src]=’product.imageUrl’/&gt;</a:t>
+              <a:t>&lt;img </a:t>
+            </a:r>
+            <a:r>
+              <a:rPr lang="pl-PL" dirty="0">
+                <a:solidFill>
+                  <a:schemeClr val="accent1"/>
+                </a:solidFill>
+              </a:rPr>
+              <a:t>[src]=’product.imageUrl’</a:t>
+            </a:r>
+            <a:r>
+              <a:rPr lang="pl-PL" dirty="0"/>
+              <a:t>/&gt;</a:t>
             </a:r>
           </a:p>
           <a:p>
@@ -30380,15 +30629,35 @@
             </a:pPr>
             <a:r>
               <a:rPr lang="pl-PL" dirty="0"/>
-              <a:t>&lt;button (click)=’</a:t>
-            </a:r>
-            <a:r>
-              <a:rPr lang="pl-PL" dirty="0" err="1"/>
+              <a:t>&lt;button </a:t>
+            </a:r>
+            <a:r>
+              <a:rPr lang="pl-PL" dirty="0">
+                <a:solidFill>
+                  <a:srgbClr val="FF0000"/>
+                </a:solidFill>
+              </a:rPr>
+              <a:t>(click)=’</a:t>
+            </a:r>
+            <a:r>
+              <a:rPr lang="pl-PL" dirty="0" err="1">
+                <a:solidFill>
+                  <a:srgbClr val="FF0000"/>
+                </a:solidFill>
+              </a:rPr>
               <a:t>toggleLogo</a:t>
             </a:r>
             <a:r>
+              <a:rPr lang="pl-PL" dirty="0">
+                <a:solidFill>
+                  <a:srgbClr val="FF0000"/>
+                </a:solidFill>
+              </a:rPr>
+              <a:t>()’</a:t>
+            </a:r>
+            <a:r>
               <a:rPr lang="pl-PL" dirty="0"/>
-              <a:t>()’/&gt;</a:t>
+              <a:t>/&gt;</a:t>
             </a:r>
           </a:p>
         </p:txBody>
@@ -30497,6 +30766,9 @@
             </a:pPr>
             <a:r>
               <a:rPr lang="pl-PL" dirty="0">
+                <a:solidFill>
+                  <a:schemeClr val="accent6"/>
+                </a:solidFill>
                 <a:latin typeface="Consolas" panose="020B0609020204030204" pitchFamily="49" charset="0"/>
                 <a:cs typeface="Consolas" panose="020B0609020204030204" pitchFamily="49" charset="0"/>
               </a:rPr>
@@ -30509,6 +30781,9 @@
             </a:pPr>
             <a:r>
               <a:rPr lang="pl-PL" dirty="0" err="1">
+                <a:solidFill>
+                  <a:schemeClr val="accent1"/>
+                </a:solidFill>
                 <a:latin typeface="Consolas" panose="020B0609020204030204" pitchFamily="49" charset="0"/>
                 <a:cs typeface="Consolas" panose="020B0609020204030204" pitchFamily="49" charset="0"/>
               </a:rPr>
@@ -30516,6 +30791,9 @@
             </a:r>
             <a:r>
               <a:rPr lang="pl-PL" dirty="0">
+                <a:solidFill>
+                  <a:schemeClr val="accent1"/>
+                </a:solidFill>
                 <a:latin typeface="Consolas" panose="020B0609020204030204" pitchFamily="49" charset="0"/>
                 <a:cs typeface="Consolas" panose="020B0609020204030204" pitchFamily="49" charset="0"/>
               </a:rPr>
@@ -30528,6 +30806,9 @@
             </a:pPr>
             <a:r>
               <a:rPr lang="pl-PL" dirty="0" err="1">
+                <a:solidFill>
+                  <a:srgbClr val="FF0000"/>
+                </a:solidFill>
                 <a:latin typeface="Consolas" panose="020B0609020204030204" pitchFamily="49" charset="0"/>
                 <a:cs typeface="Consolas" panose="020B0609020204030204" pitchFamily="49" charset="0"/>
               </a:rPr>
@@ -30535,6 +30816,9 @@
             </a:r>
             <a:r>
               <a:rPr lang="pl-PL" dirty="0">
+                <a:solidFill>
+                  <a:srgbClr val="FF0000"/>
+                </a:solidFill>
                 <a:latin typeface="Consolas" panose="020B0609020204030204" pitchFamily="49" charset="0"/>
                 <a:cs typeface="Consolas" panose="020B0609020204030204" pitchFamily="49" charset="0"/>
               </a:rPr>
@@ -30739,56 +31023,6 @@
             <a:r>
               <a:rPr lang="pl-PL" sz="2400" dirty="0"/>
               <a:t>Szablon wyrażenia   ()</a:t>
-            </a:r>
-          </a:p>
-        </p:txBody>
-      </p:sp>
-      <p:sp>
-        <p:nvSpPr>
-          <p:cNvPr id="14" name="TextBox 13">
-            <a:extLst>
-              <a:ext uri="{FF2B5EF4-FFF2-40B4-BE49-F238E27FC236}">
-                <a16:creationId xmlns:a16="http://schemas.microsoft.com/office/drawing/2014/main" id="{138D5B4D-95AF-4954-8E8A-67EB800C515B}"/>
-              </a:ext>
-            </a:extLst>
-          </p:cNvPr>
-          <p:cNvSpPr txBox="1"/>
-          <p:nvPr/>
-        </p:nvSpPr>
-        <p:spPr>
-          <a:xfrm>
-            <a:off x="883848" y="5866497"/>
-            <a:ext cx="10427480" cy="646331"/>
-          </a:xfrm>
-          <a:prstGeom prst="rect">
-            <a:avLst/>
-          </a:prstGeom>
-        </p:spPr>
-        <p:style>
-          <a:lnRef idx="2">
-            <a:schemeClr val="accent6">
-              <a:shade val="50000"/>
-            </a:schemeClr>
-          </a:lnRef>
-          <a:fillRef idx="1">
-            <a:schemeClr val="accent6"/>
-          </a:fillRef>
-          <a:effectRef idx="0">
-            <a:schemeClr val="accent6"/>
-          </a:effectRef>
-          <a:fontRef idx="minor">
-            <a:schemeClr val="lt1"/>
-          </a:fontRef>
-        </p:style>
-        <p:txBody>
-          <a:bodyPr wrap="square" rtlCol="0">
-            <a:spAutoFit/>
-          </a:bodyPr>
-          <a:lstStyle/>
-          <a:p>
-            <a:r>
-              <a:rPr lang="pl-PL" sz="3600" dirty="0"/>
-              <a:t>https://developer.mozilla.org/en-US/docs/Web/Events</a:t>
             </a:r>
           </a:p>
         </p:txBody>
@@ -31100,59 +31334,6 @@
                       </p:childTnLst>
                     </p:cTn>
                   </p:par>
-                  <p:par>
-                    <p:cTn id="26" fill="hold">
-                      <p:stCondLst>
-                        <p:cond delay="indefinite"/>
-                      </p:stCondLst>
-                      <p:childTnLst>
-                        <p:par>
-                          <p:cTn id="27" fill="hold">
-                            <p:stCondLst>
-                              <p:cond delay="0"/>
-                            </p:stCondLst>
-                            <p:childTnLst>
-                              <p:par>
-                                <p:cTn id="28" presetID="10" presetClass="entr" presetSubtype="0" fill="hold" grpId="0" nodeType="clickEffect">
-                                  <p:stCondLst>
-                                    <p:cond delay="0"/>
-                                  </p:stCondLst>
-                                  <p:childTnLst>
-                                    <p:set>
-                                      <p:cBhvr>
-                                        <p:cTn id="29" dur="1" fill="hold">
-                                          <p:stCondLst>
-                                            <p:cond delay="0"/>
-                                          </p:stCondLst>
-                                        </p:cTn>
-                                        <p:tgtEl>
-                                          <p:spTgt spid="14"/>
-                                        </p:tgtEl>
-                                        <p:attrNameLst>
-                                          <p:attrName>style.visibility</p:attrName>
-                                        </p:attrNameLst>
-                                      </p:cBhvr>
-                                      <p:to>
-                                        <p:strVal val="visible"/>
-                                      </p:to>
-                                    </p:set>
-                                    <p:animEffect transition="in" filter="fade">
-                                      <p:cBhvr>
-                                        <p:cTn id="30" dur="500"/>
-                                        <p:tgtEl>
-                                          <p:spTgt spid="14"/>
-                                        </p:tgtEl>
-                                      </p:cBhvr>
-                                    </p:animEffect>
-                                  </p:childTnLst>
-                                </p:cTn>
-                              </p:par>
-                            </p:childTnLst>
-                          </p:cTn>
-                        </p:par>
-                      </p:childTnLst>
-                    </p:cTn>
-                  </p:par>
                 </p:childTnLst>
               </p:cTn>
               <p:prevCondLst>
@@ -31177,7 +31358,6 @@
     <p:bldLst>
       <p:bldP spid="12" grpId="0" animBg="1"/>
       <p:bldP spid="13" grpId="0" animBg="1"/>
-      <p:bldP spid="14" grpId="0" animBg="1"/>
     </p:bldLst>
   </p:timing>
 </p:sld>
@@ -32623,7 +32803,19 @@
             </a:pPr>
             <a:r>
               <a:rPr lang="pl-PL" dirty="0"/>
-              <a:t>{{pageTitle | lowercase}}</a:t>
+              <a:t>{{pageTitle </a:t>
+            </a:r>
+            <a:r>
+              <a:rPr lang="pl-PL" dirty="0">
+                <a:solidFill>
+                  <a:srgbClr val="FF0000"/>
+                </a:solidFill>
+              </a:rPr>
+              <a:t>| lowercase</a:t>
+            </a:r>
+            <a:r>
+              <a:rPr lang="pl-PL" dirty="0"/>
+              <a:t>}}</a:t>
             </a:r>
           </a:p>
           <a:p>
@@ -32642,7 +32834,7 @@
             </a:r>
             <a:r>
               <a:rPr lang="pl-PL" dirty="0"/>
-              <a:t> [</a:t>
+              <a:t> [src]=‘product.Name</a:t>
             </a:r>
             <a:r>
               <a:rPr lang="pl-PL" dirty="0">
@@ -32650,19 +32842,7 @@
                   <a:srgbClr val="FF0000"/>
                 </a:solidFill>
               </a:rPr>
-              <a:t>src</a:t>
-            </a:r>
-            <a:r>
-              <a:rPr lang="pl-PL" dirty="0"/>
-              <a:t>]=‘</a:t>
-            </a:r>
-            <a:r>
-              <a:rPr lang="pl-PL" dirty="0">
-                <a:solidFill>
-                  <a:srgbClr val="FF0000"/>
-                </a:solidFill>
-              </a:rPr>
-              <a:t>product.Name | uppercase</a:t>
+              <a:t> | uppercase</a:t>
             </a:r>
             <a:r>
               <a:rPr lang="pl-PL" dirty="0"/>
@@ -32685,7 +32865,19 @@
             </a:pPr>
             <a:r>
               <a:rPr lang="pl-PL" dirty="0"/>
-              <a:t>{{product.Price | currency | lowercase}}</a:t>
+              <a:t>{{product.Price </a:t>
+            </a:r>
+            <a:r>
+              <a:rPr lang="pl-PL" dirty="0">
+                <a:solidFill>
+                  <a:srgbClr val="FF0000"/>
+                </a:solidFill>
+              </a:rPr>
+              <a:t>| currency | lowercase</a:t>
+            </a:r>
+            <a:r>
+              <a:rPr lang="pl-PL" dirty="0"/>
+              <a:t>}}</a:t>
             </a:r>
           </a:p>
           <a:p>
@@ -32694,7 +32886,19 @@
             </a:pPr>
             <a:r>
               <a:rPr lang="pl-PL" dirty="0"/>
-              <a:t>{{product.Price | currency :”PLN”:true:”1.2-2”}}</a:t>
+              <a:t>{{product.Price </a:t>
+            </a:r>
+            <a:r>
+              <a:rPr lang="pl-PL" dirty="0">
+                <a:solidFill>
+                  <a:srgbClr val="FF0000"/>
+                </a:solidFill>
+              </a:rPr>
+              <a:t>| currency :”PLN”:true:”1.2-2”</a:t>
+            </a:r>
+            <a:r>
+              <a:rPr lang="pl-PL" dirty="0"/>
+              <a:t>}}</a:t>
             </a:r>
           </a:p>
           <a:p>
@@ -32715,6 +32919,226 @@
   <p:clrMapOvr>
     <a:masterClrMapping/>
   </p:clrMapOvr>
+  <p:timing>
+    <p:tnLst>
+      <p:par>
+        <p:cTn id="1" dur="indefinite" restart="never" nodeType="tmRoot">
+          <p:childTnLst>
+            <p:seq concurrent="1" nextAc="seek">
+              <p:cTn id="2" dur="indefinite" nodeType="mainSeq">
+                <p:childTnLst>
+                  <p:par>
+                    <p:cTn id="3" fill="hold">
+                      <p:stCondLst>
+                        <p:cond delay="indefinite"/>
+                      </p:stCondLst>
+                      <p:childTnLst>
+                        <p:par>
+                          <p:cTn id="4" fill="hold">
+                            <p:stCondLst>
+                              <p:cond delay="0"/>
+                            </p:stCondLst>
+                            <p:childTnLst>
+                              <p:par>
+                                <p:cTn id="5" presetID="10" presetClass="entr" presetSubtype="0" fill="hold" nodeType="clickEffect">
+                                  <p:stCondLst>
+                                    <p:cond delay="0"/>
+                                  </p:stCondLst>
+                                  <p:childTnLst>
+                                    <p:set>
+                                      <p:cBhvr>
+                                        <p:cTn id="6" dur="1" fill="hold">
+                                          <p:stCondLst>
+                                            <p:cond delay="0"/>
+                                          </p:stCondLst>
+                                        </p:cTn>
+                                        <p:tgtEl>
+                                          <p:spTgt spid="3">
+                                            <p:txEl>
+                                              <p:pRg st="0" end="0"/>
+                                            </p:txEl>
+                                          </p:spTgt>
+                                        </p:tgtEl>
+                                        <p:attrNameLst>
+                                          <p:attrName>style.visibility</p:attrName>
+                                        </p:attrNameLst>
+                                      </p:cBhvr>
+                                      <p:to>
+                                        <p:strVal val="visible"/>
+                                      </p:to>
+                                    </p:set>
+                                    <p:animEffect transition="in" filter="fade">
+                                      <p:cBhvr>
+                                        <p:cTn id="7" dur="500"/>
+                                        <p:tgtEl>
+                                          <p:spTgt spid="3">
+                                            <p:txEl>
+                                              <p:pRg st="0" end="0"/>
+                                            </p:txEl>
+                                          </p:spTgt>
+                                        </p:tgtEl>
+                                      </p:cBhvr>
+                                    </p:animEffect>
+                                  </p:childTnLst>
+                                </p:cTn>
+                              </p:par>
+                              <p:par>
+                                <p:cTn id="8" presetID="10" presetClass="entr" presetSubtype="0" fill="hold" nodeType="withEffect">
+                                  <p:stCondLst>
+                                    <p:cond delay="0"/>
+                                  </p:stCondLst>
+                                  <p:childTnLst>
+                                    <p:set>
+                                      <p:cBhvr>
+                                        <p:cTn id="9" dur="1" fill="hold">
+                                          <p:stCondLst>
+                                            <p:cond delay="0"/>
+                                          </p:stCondLst>
+                                        </p:cTn>
+                                        <p:tgtEl>
+                                          <p:spTgt spid="3">
+                                            <p:txEl>
+                                              <p:pRg st="1" end="1"/>
+                                            </p:txEl>
+                                          </p:spTgt>
+                                        </p:tgtEl>
+                                        <p:attrNameLst>
+                                          <p:attrName>style.visibility</p:attrName>
+                                        </p:attrNameLst>
+                                      </p:cBhvr>
+                                      <p:to>
+                                        <p:strVal val="visible"/>
+                                      </p:to>
+                                    </p:set>
+                                    <p:animEffect transition="in" filter="fade">
+                                      <p:cBhvr>
+                                        <p:cTn id="10" dur="500"/>
+                                        <p:tgtEl>
+                                          <p:spTgt spid="3">
+                                            <p:txEl>
+                                              <p:pRg st="1" end="1"/>
+                                            </p:txEl>
+                                          </p:spTgt>
+                                        </p:tgtEl>
+                                      </p:cBhvr>
+                                    </p:animEffect>
+                                  </p:childTnLst>
+                                </p:cTn>
+                              </p:par>
+                              <p:par>
+                                <p:cTn id="11" presetID="10" presetClass="entr" presetSubtype="0" fill="hold" nodeType="withEffect">
+                                  <p:stCondLst>
+                                    <p:cond delay="0"/>
+                                  </p:stCondLst>
+                                  <p:childTnLst>
+                                    <p:set>
+                                      <p:cBhvr>
+                                        <p:cTn id="12" dur="1" fill="hold">
+                                          <p:stCondLst>
+                                            <p:cond delay="0"/>
+                                          </p:stCondLst>
+                                        </p:cTn>
+                                        <p:tgtEl>
+                                          <p:spTgt spid="3">
+                                            <p:txEl>
+                                              <p:pRg st="2" end="2"/>
+                                            </p:txEl>
+                                          </p:spTgt>
+                                        </p:tgtEl>
+                                        <p:attrNameLst>
+                                          <p:attrName>style.visibility</p:attrName>
+                                        </p:attrNameLst>
+                                      </p:cBhvr>
+                                      <p:to>
+                                        <p:strVal val="visible"/>
+                                      </p:to>
+                                    </p:set>
+                                    <p:animEffect transition="in" filter="fade">
+                                      <p:cBhvr>
+                                        <p:cTn id="13" dur="500"/>
+                                        <p:tgtEl>
+                                          <p:spTgt spid="3">
+                                            <p:txEl>
+                                              <p:pRg st="2" end="2"/>
+                                            </p:txEl>
+                                          </p:spTgt>
+                                        </p:tgtEl>
+                                      </p:cBhvr>
+                                    </p:animEffect>
+                                  </p:childTnLst>
+                                </p:cTn>
+                              </p:par>
+                              <p:par>
+                                <p:cTn id="14" presetID="10" presetClass="entr" presetSubtype="0" fill="hold" nodeType="withEffect">
+                                  <p:stCondLst>
+                                    <p:cond delay="0"/>
+                                  </p:stCondLst>
+                                  <p:childTnLst>
+                                    <p:set>
+                                      <p:cBhvr>
+                                        <p:cTn id="15" dur="1" fill="hold">
+                                          <p:stCondLst>
+                                            <p:cond delay="0"/>
+                                          </p:stCondLst>
+                                        </p:cTn>
+                                        <p:tgtEl>
+                                          <p:spTgt spid="3">
+                                            <p:txEl>
+                                              <p:pRg st="3" end="3"/>
+                                            </p:txEl>
+                                          </p:spTgt>
+                                        </p:tgtEl>
+                                        <p:attrNameLst>
+                                          <p:attrName>style.visibility</p:attrName>
+                                        </p:attrNameLst>
+                                      </p:cBhvr>
+                                      <p:to>
+                                        <p:strVal val="visible"/>
+                                      </p:to>
+                                    </p:set>
+                                    <p:animEffect transition="in" filter="fade">
+                                      <p:cBhvr>
+                                        <p:cTn id="16" dur="500"/>
+                                        <p:tgtEl>
+                                          <p:spTgt spid="3">
+                                            <p:txEl>
+                                              <p:pRg st="3" end="3"/>
+                                            </p:txEl>
+                                          </p:spTgt>
+                                        </p:tgtEl>
+                                      </p:cBhvr>
+                                    </p:animEffect>
+                                  </p:childTnLst>
+                                </p:cTn>
+                              </p:par>
+                            </p:childTnLst>
+                          </p:cTn>
+                        </p:par>
+                      </p:childTnLst>
+                    </p:cTn>
+                  </p:par>
+                </p:childTnLst>
+              </p:cTn>
+              <p:prevCondLst>
+                <p:cond evt="onPrev" delay="0">
+                  <p:tgtEl>
+                    <p:sldTgt/>
+                  </p:tgtEl>
+                </p:cond>
+              </p:prevCondLst>
+              <p:nextCondLst>
+                <p:cond evt="onNext" delay="0">
+                  <p:tgtEl>
+                    <p:sldTgt/>
+                  </p:tgtEl>
+                </p:cond>
+              </p:nextCondLst>
+            </p:seq>
+          </p:childTnLst>
+        </p:cTn>
+      </p:par>
+    </p:tnLst>
+  </p:timing>
 </p:sld>
 </file>
 

</xml_diff>

<commit_message>
Currency pipe link was added to presentation for Workshop 2
</commit_message>
<xml_diff>
--- a/2/presentation/Angular 2.pptx
+++ b/2/presentation/Angular 2.pptx
@@ -10955,7 +10955,7 @@
           <a:p>
             <a:fld id="{A7D59A82-B575-4226-8A09-A5B072479177}" type="datetimeFigureOut">
               <a:rPr lang="pl-PL" smtClean="0"/>
-              <a:t>24.02.2021</a:t>
+              <a:t>25.02.2021</a:t>
             </a:fld>
             <a:endParaRPr lang="pl-PL"/>
           </a:p>
@@ -11267,22 +11267,6 @@
           <a:bodyPr/>
           <a:lstStyle/>
           <a:p>
-            <a:r>
-              <a:rPr lang="pl-PL" dirty="0"/>
-              <a:t>Input i </a:t>
-            </a:r>
-            <a:r>
-              <a:rPr lang="pl-PL" dirty="0" err="1"/>
-              <a:t>Output</a:t>
-            </a:r>
-            <a:r>
-              <a:rPr lang="pl-PL" dirty="0"/>
-              <a:t> </a:t>
-            </a:r>
-            <a:r>
-              <a:rPr lang="pl-PL" dirty="0" err="1"/>
-              <a:t>binding</a:t>
-            </a:r>
             <a:endParaRPr lang="pl-PL" dirty="0"/>
           </a:p>
         </p:txBody>
@@ -12631,7 +12615,7 @@
           <a:p>
             <a:fld id="{5E543113-3ECC-4DC9-B636-16B32516798D}" type="datetimeFigureOut">
               <a:rPr lang="pl-PL" smtClean="0"/>
-              <a:t>24.02.2021</a:t>
+              <a:t>25.02.2021</a:t>
             </a:fld>
             <a:endParaRPr lang="pl-PL"/>
           </a:p>
@@ -12831,7 +12815,7 @@
           <a:p>
             <a:fld id="{5E543113-3ECC-4DC9-B636-16B32516798D}" type="datetimeFigureOut">
               <a:rPr lang="pl-PL" smtClean="0"/>
-              <a:t>24.02.2021</a:t>
+              <a:t>25.02.2021</a:t>
             </a:fld>
             <a:endParaRPr lang="pl-PL"/>
           </a:p>
@@ -13041,7 +13025,7 @@
           <a:p>
             <a:fld id="{5E543113-3ECC-4DC9-B636-16B32516798D}" type="datetimeFigureOut">
               <a:rPr lang="pl-PL" smtClean="0"/>
-              <a:t>24.02.2021</a:t>
+              <a:t>25.02.2021</a:t>
             </a:fld>
             <a:endParaRPr lang="pl-PL"/>
           </a:p>
@@ -13241,7 +13225,7 @@
           <a:p>
             <a:fld id="{5E543113-3ECC-4DC9-B636-16B32516798D}" type="datetimeFigureOut">
               <a:rPr lang="pl-PL" smtClean="0"/>
-              <a:t>24.02.2021</a:t>
+              <a:t>25.02.2021</a:t>
             </a:fld>
             <a:endParaRPr lang="pl-PL"/>
           </a:p>
@@ -13517,7 +13501,7 @@
           <a:p>
             <a:fld id="{5E543113-3ECC-4DC9-B636-16B32516798D}" type="datetimeFigureOut">
               <a:rPr lang="pl-PL" smtClean="0"/>
-              <a:t>24.02.2021</a:t>
+              <a:t>25.02.2021</a:t>
             </a:fld>
             <a:endParaRPr lang="pl-PL"/>
           </a:p>
@@ -13785,7 +13769,7 @@
           <a:p>
             <a:fld id="{5E543113-3ECC-4DC9-B636-16B32516798D}" type="datetimeFigureOut">
               <a:rPr lang="pl-PL" smtClean="0"/>
-              <a:t>24.02.2021</a:t>
+              <a:t>25.02.2021</a:t>
             </a:fld>
             <a:endParaRPr lang="pl-PL"/>
           </a:p>
@@ -14200,7 +14184,7 @@
           <a:p>
             <a:fld id="{5E543113-3ECC-4DC9-B636-16B32516798D}" type="datetimeFigureOut">
               <a:rPr lang="pl-PL" smtClean="0"/>
-              <a:t>24.02.2021</a:t>
+              <a:t>25.02.2021</a:t>
             </a:fld>
             <a:endParaRPr lang="pl-PL"/>
           </a:p>
@@ -14342,7 +14326,7 @@
           <a:p>
             <a:fld id="{5E543113-3ECC-4DC9-B636-16B32516798D}" type="datetimeFigureOut">
               <a:rPr lang="pl-PL" smtClean="0"/>
-              <a:t>24.02.2021</a:t>
+              <a:t>25.02.2021</a:t>
             </a:fld>
             <a:endParaRPr lang="pl-PL"/>
           </a:p>
@@ -14455,7 +14439,7 @@
           <a:p>
             <a:fld id="{5E543113-3ECC-4DC9-B636-16B32516798D}" type="datetimeFigureOut">
               <a:rPr lang="pl-PL" smtClean="0"/>
-              <a:t>24.02.2021</a:t>
+              <a:t>25.02.2021</a:t>
             </a:fld>
             <a:endParaRPr lang="pl-PL"/>
           </a:p>
@@ -14768,7 +14752,7 @@
           <a:p>
             <a:fld id="{5E543113-3ECC-4DC9-B636-16B32516798D}" type="datetimeFigureOut">
               <a:rPr lang="pl-PL" smtClean="0"/>
-              <a:t>24.02.2021</a:t>
+              <a:t>25.02.2021</a:t>
             </a:fld>
             <a:endParaRPr lang="pl-PL"/>
           </a:p>
@@ -15057,7 +15041,7 @@
           <a:p>
             <a:fld id="{5E543113-3ECC-4DC9-B636-16B32516798D}" type="datetimeFigureOut">
               <a:rPr lang="pl-PL" smtClean="0"/>
-              <a:t>24.02.2021</a:t>
+              <a:t>25.02.2021</a:t>
             </a:fld>
             <a:endParaRPr lang="pl-PL"/>
           </a:p>
@@ -15300,7 +15284,7 @@
           <a:p>
             <a:fld id="{5E543113-3ECC-4DC9-B636-16B32516798D}" type="datetimeFigureOut">
               <a:rPr lang="pl-PL" smtClean="0"/>
-              <a:t>24.02.2021</a:t>
+              <a:t>25.02.2021</a:t>
             </a:fld>
             <a:endParaRPr lang="pl-PL"/>
           </a:p>
@@ -30260,37 +30244,37 @@
           </a:p>
           <a:p>
             <a:r>
+              <a:rPr lang="pl-PL" dirty="0" err="1">
+                <a:hlinkClick r:id="rId4"/>
+              </a:rPr>
+              <a:t>Currency</a:t>
+            </a:r>
+            <a:r>
               <a:rPr lang="pl-PL" dirty="0">
                 <a:hlinkClick r:id="rId4"/>
               </a:rPr>
-              <a:t>Component </a:t>
+              <a:t> </a:t>
             </a:r>
             <a:r>
               <a:rPr lang="pl-PL" dirty="0" err="1">
                 <a:hlinkClick r:id="rId4"/>
               </a:rPr>
-              <a:t>styles</a:t>
+              <a:t>pipe</a:t>
             </a:r>
             <a:endParaRPr lang="pl-PL" dirty="0"/>
           </a:p>
           <a:p>
+            <a:r>
+              <a:rPr lang="pl-PL" dirty="0">
+                <a:hlinkClick r:id="rId5"/>
+              </a:rPr>
+              <a:t>Component </a:t>
+            </a:r>
             <a:r>
               <a:rPr lang="pl-PL" dirty="0" err="1">
                 <a:hlinkClick r:id="rId5"/>
               </a:rPr>
-              <a:t>View</a:t>
-            </a:r>
-            <a:r>
-              <a:rPr lang="pl-PL" dirty="0">
-                <a:hlinkClick r:id="rId5"/>
-              </a:rPr>
-              <a:t> </a:t>
-            </a:r>
-            <a:r>
-              <a:rPr lang="pl-PL" dirty="0" err="1">
-                <a:hlinkClick r:id="rId5"/>
-              </a:rPr>
-              <a:t>encapsulation</a:t>
+              <a:t>styles</a:t>
             </a:r>
             <a:endParaRPr lang="pl-PL" dirty="0"/>
           </a:p>
@@ -30299,7 +30283,7 @@
               <a:rPr lang="pl-PL" dirty="0" err="1">
                 <a:hlinkClick r:id="rId6"/>
               </a:rPr>
-              <a:t>Lifecycle</a:t>
+              <a:t>View</a:t>
             </a:r>
             <a:r>
               <a:rPr lang="pl-PL" dirty="0">
@@ -30311,41 +30295,62 @@
               <a:rPr lang="pl-PL" dirty="0" err="1">
                 <a:hlinkClick r:id="rId6"/>
               </a:rPr>
-              <a:t>hooks</a:t>
+              <a:t>encapsulation</a:t>
             </a:r>
             <a:endParaRPr lang="pl-PL" dirty="0"/>
           </a:p>
           <a:p>
+            <a:r>
+              <a:rPr lang="pl-PL" dirty="0" err="1">
+                <a:hlinkClick r:id="rId7"/>
+              </a:rPr>
+              <a:t>Lifecycle</a:t>
+            </a:r>
             <a:r>
               <a:rPr lang="pl-PL" dirty="0">
                 <a:hlinkClick r:id="rId7"/>
               </a:rPr>
-              <a:t>Font </a:t>
+              <a:t> </a:t>
             </a:r>
             <a:r>
               <a:rPr lang="pl-PL" dirty="0" err="1">
                 <a:hlinkClick r:id="rId7"/>
               </a:rPr>
-              <a:t>awesome</a:t>
+              <a:t>hooks</a:t>
             </a:r>
             <a:endParaRPr lang="pl-PL" dirty="0"/>
           </a:p>
           <a:p>
+            <a:r>
+              <a:rPr lang="pl-PL" dirty="0">
+                <a:hlinkClick r:id="rId8"/>
+              </a:rPr>
+              <a:t>Font </a:t>
+            </a:r>
             <a:r>
               <a:rPr lang="pl-PL" dirty="0" err="1">
                 <a:hlinkClick r:id="rId8"/>
               </a:rPr>
+              <a:t>awesome</a:t>
+            </a:r>
+            <a:endParaRPr lang="pl-PL" dirty="0"/>
+          </a:p>
+          <a:p>
+            <a:r>
+              <a:rPr lang="pl-PL" dirty="0" err="1">
+                <a:hlinkClick r:id="rId9"/>
+              </a:rPr>
               <a:t>Dependecy</a:t>
             </a:r>
             <a:r>
               <a:rPr lang="pl-PL" dirty="0">
-                <a:hlinkClick r:id="rId8"/>
+                <a:hlinkClick r:id="rId9"/>
               </a:rPr>
               <a:t> </a:t>
             </a:r>
             <a:r>
               <a:rPr lang="pl-PL" dirty="0" err="1">
-                <a:hlinkClick r:id="rId8"/>
+                <a:hlinkClick r:id="rId9"/>
               </a:rPr>
               <a:t>Injection</a:t>
             </a:r>
@@ -30373,7 +30378,7 @@
           </p:nvPr>
         </p:nvPicPr>
         <p:blipFill>
-          <a:blip r:embed="rId9">
+          <a:blip r:embed="rId10">
             <a:extLst>
               <a:ext uri="{28A0092B-C50C-407E-A947-70E740481C1C}">
                 <a14:useLocalDpi xmlns:a14="http://schemas.microsoft.com/office/drawing/2010/main" val="0"/>

</xml_diff>